<commit_message>
big data kurulum eklendi
</commit_message>
<xml_diff>
--- a/acilis_sunumu.pptx
+++ b/acilis_sunumu.pptx
@@ -134,19 +134,42 @@
 <pc:chgInfo xmlns:a="http://schemas.openxmlformats.org/drawingml/2006/main" xmlns:r="http://schemas.openxmlformats.org/officeDocument/2006/relationships" xmlns:ac="http://schemas.microsoft.com/office/drawing/2013/main/command" xmlns:pc="http://schemas.microsoft.com/office/powerpoint/2013/main/command">
   <pc:docChgLst>
     <pc:chgData name="Erkan ŞİRİN" userId="7f10ce1d6aaf8c5d" providerId="LiveId" clId="{1BFD029C-DFCC-425B-8851-621E66778794}"/>
-    <pc:docChg chg="modSld">
-      <pc:chgData name="Erkan ŞİRİN" userId="7f10ce1d6aaf8c5d" providerId="LiveId" clId="{1BFD029C-DFCC-425B-8851-621E66778794}" dt="2019-05-24T12:59:49.664" v="6" actId="20577"/>
+    <pc:docChg chg="custSel modSld">
+      <pc:chgData name="Erkan ŞİRİN" userId="7f10ce1d6aaf8c5d" providerId="LiveId" clId="{1BFD029C-DFCC-425B-8851-621E66778794}" dt="2019-07-02T06:16:01.978" v="53" actId="20577"/>
       <pc:docMkLst>
         <pc:docMk/>
       </pc:docMkLst>
       <pc:sldChg chg="modSp">
-        <pc:chgData name="Erkan ŞİRİN" userId="7f10ce1d6aaf8c5d" providerId="LiveId" clId="{1BFD029C-DFCC-425B-8851-621E66778794}" dt="2019-05-24T12:59:49.664" v="6" actId="20577"/>
+        <pc:chgData name="Erkan ŞİRİN" userId="7f10ce1d6aaf8c5d" providerId="LiveId" clId="{1BFD029C-DFCC-425B-8851-621E66778794}" dt="2019-07-02T06:16:01.978" v="53" actId="20577"/>
+        <pc:sldMkLst>
+          <pc:docMk/>
+          <pc:sldMk cId="3627367780" sldId="328"/>
+        </pc:sldMkLst>
+        <pc:spChg chg="mod">
+          <ac:chgData name="Erkan ŞİRİN" userId="7f10ce1d6aaf8c5d" providerId="LiveId" clId="{1BFD029C-DFCC-425B-8851-621E66778794}" dt="2019-07-02T06:15:48.323" v="38" actId="20577"/>
+          <ac:spMkLst>
+            <pc:docMk/>
+            <pc:sldMk cId="3627367780" sldId="328"/>
+            <ac:spMk id="3" creationId="{2DC8A280-C738-452F-B627-12CB68E50CC1}"/>
+          </ac:spMkLst>
+        </pc:spChg>
+        <pc:spChg chg="mod">
+          <ac:chgData name="Erkan ŞİRİN" userId="7f10ce1d6aaf8c5d" providerId="LiveId" clId="{1BFD029C-DFCC-425B-8851-621E66778794}" dt="2019-07-02T06:16:01.978" v="53" actId="20577"/>
+          <ac:spMkLst>
+            <pc:docMk/>
+            <pc:sldMk cId="3627367780" sldId="328"/>
+            <ac:spMk id="16" creationId="{00000000-0000-0000-0000-000000000000}"/>
+          </ac:spMkLst>
+        </pc:spChg>
+      </pc:sldChg>
+      <pc:sldChg chg="modSp">
+        <pc:chgData name="Erkan ŞİRİN" userId="7f10ce1d6aaf8c5d" providerId="LiveId" clId="{1BFD029C-DFCC-425B-8851-621E66778794}" dt="2019-07-02T06:15:07.802" v="33" actId="207"/>
         <pc:sldMkLst>
           <pc:docMk/>
           <pc:sldMk cId="2360627406" sldId="334"/>
         </pc:sldMkLst>
         <pc:graphicFrameChg chg="modGraphic">
-          <ac:chgData name="Erkan ŞİRİN" userId="7f10ce1d6aaf8c5d" providerId="LiveId" clId="{1BFD029C-DFCC-425B-8851-621E66778794}" dt="2019-05-24T12:59:49.664" v="6" actId="20577"/>
+          <ac:chgData name="Erkan ŞİRİN" userId="7f10ce1d6aaf8c5d" providerId="LiveId" clId="{1BFD029C-DFCC-425B-8851-621E66778794}" dt="2019-07-02T06:15:07.802" v="33" actId="207"/>
           <ac:graphicFrameMkLst>
             <pc:docMk/>
             <pc:sldMk cId="2360627406" sldId="334"/>
@@ -600,7 +623,7 @@
           <a:p>
             <a:fld id="{BAB971F1-0A24-473E-8A66-D77E329B588E}" type="datetimeFigureOut">
               <a:rPr lang="tr-TR" smtClean="0"/>
-              <a:t>24.05.2019</a:t>
+              <a:t>2.07.2019</a:t>
             </a:fld>
             <a:endParaRPr lang="tr-TR"/>
           </a:p>
@@ -798,7 +821,7 @@
           <a:p>
             <a:fld id="{BAB971F1-0A24-473E-8A66-D77E329B588E}" type="datetimeFigureOut">
               <a:rPr lang="tr-TR" smtClean="0"/>
-              <a:t>24.05.2019</a:t>
+              <a:t>2.07.2019</a:t>
             </a:fld>
             <a:endParaRPr lang="tr-TR"/>
           </a:p>
@@ -1006,7 +1029,7 @@
           <a:p>
             <a:fld id="{BAB971F1-0A24-473E-8A66-D77E329B588E}" type="datetimeFigureOut">
               <a:rPr lang="tr-TR" smtClean="0"/>
-              <a:t>24.05.2019</a:t>
+              <a:t>2.07.2019</a:t>
             </a:fld>
             <a:endParaRPr lang="tr-TR"/>
           </a:p>
@@ -1204,7 +1227,7 @@
           <a:p>
             <a:fld id="{BAB971F1-0A24-473E-8A66-D77E329B588E}" type="datetimeFigureOut">
               <a:rPr lang="tr-TR" smtClean="0"/>
-              <a:t>24.05.2019</a:t>
+              <a:t>2.07.2019</a:t>
             </a:fld>
             <a:endParaRPr lang="tr-TR"/>
           </a:p>
@@ -1479,7 +1502,7 @@
           <a:p>
             <a:fld id="{BAB971F1-0A24-473E-8A66-D77E329B588E}" type="datetimeFigureOut">
               <a:rPr lang="tr-TR" smtClean="0"/>
-              <a:t>24.05.2019</a:t>
+              <a:t>2.07.2019</a:t>
             </a:fld>
             <a:endParaRPr lang="tr-TR"/>
           </a:p>
@@ -1744,7 +1767,7 @@
           <a:p>
             <a:fld id="{BAB971F1-0A24-473E-8A66-D77E329B588E}" type="datetimeFigureOut">
               <a:rPr lang="tr-TR" smtClean="0"/>
-              <a:t>24.05.2019</a:t>
+              <a:t>2.07.2019</a:t>
             </a:fld>
             <a:endParaRPr lang="tr-TR"/>
           </a:p>
@@ -2156,7 +2179,7 @@
           <a:p>
             <a:fld id="{BAB971F1-0A24-473E-8A66-D77E329B588E}" type="datetimeFigureOut">
               <a:rPr lang="tr-TR" smtClean="0"/>
-              <a:t>24.05.2019</a:t>
+              <a:t>2.07.2019</a:t>
             </a:fld>
             <a:endParaRPr lang="tr-TR"/>
           </a:p>
@@ -2297,7 +2320,7 @@
           <a:p>
             <a:fld id="{BAB971F1-0A24-473E-8A66-D77E329B588E}" type="datetimeFigureOut">
               <a:rPr lang="tr-TR" smtClean="0"/>
-              <a:t>24.05.2019</a:t>
+              <a:t>2.07.2019</a:t>
             </a:fld>
             <a:endParaRPr lang="tr-TR"/>
           </a:p>
@@ -2410,7 +2433,7 @@
           <a:p>
             <a:fld id="{BAB971F1-0A24-473E-8A66-D77E329B588E}" type="datetimeFigureOut">
               <a:rPr lang="tr-TR" smtClean="0"/>
-              <a:t>24.05.2019</a:t>
+              <a:t>2.07.2019</a:t>
             </a:fld>
             <a:endParaRPr lang="tr-TR"/>
           </a:p>
@@ -2721,7 +2744,7 @@
           <a:p>
             <a:fld id="{BAB971F1-0A24-473E-8A66-D77E329B588E}" type="datetimeFigureOut">
               <a:rPr lang="tr-TR" smtClean="0"/>
-              <a:t>24.05.2019</a:t>
+              <a:t>2.07.2019</a:t>
             </a:fld>
             <a:endParaRPr lang="tr-TR"/>
           </a:p>
@@ -3009,7 +3032,7 @@
           <a:p>
             <a:fld id="{BAB971F1-0A24-473E-8A66-D77E329B588E}" type="datetimeFigureOut">
               <a:rPr lang="tr-TR" smtClean="0"/>
-              <a:t>24.05.2019</a:t>
+              <a:t>2.07.2019</a:t>
             </a:fld>
             <a:endParaRPr lang="tr-TR"/>
           </a:p>
@@ -3250,7 +3273,7 @@
           <a:p>
             <a:fld id="{BAB971F1-0A24-473E-8A66-D77E329B588E}" type="datetimeFigureOut">
               <a:rPr lang="tr-TR" smtClean="0"/>
-              <a:t>24.05.2019</a:t>
+              <a:t>2.07.2019</a:t>
             </a:fld>
             <a:endParaRPr lang="tr-TR"/>
           </a:p>
@@ -4281,7 +4304,7 @@
                 <a:ea typeface="+mn-ea"/>
                 <a:cs typeface="+mn-cs"/>
               </a:rPr>
-              <a:t>İdari Konular</a:t>
+              <a:t>Zaman Çizelgesi</a:t>
             </a:r>
             <a:endParaRPr lang="en-US" sz="4000" b="1" dirty="0">
               <a:solidFill>
@@ -4332,7 +4355,7 @@
               <a:rPr lang="tr-TR" sz="3200" dirty="0">
                 <a:latin typeface="Roboto"/>
               </a:rPr>
-              <a:t>Öğleden Önce	: 09:00 – 12:30</a:t>
+              <a:t>Öğleden Önce	: 09:30 – 12:30</a:t>
             </a:r>
           </a:p>
           <a:p>
@@ -4360,7 +4383,7 @@
               <a:rPr lang="tr-TR" sz="3200" dirty="0">
                 <a:latin typeface="Roboto"/>
               </a:rPr>
-              <a:t>Öğleden Sonra	: 14:00 – 16:30</a:t>
+              <a:t>Öğleden Sonra	: 14:00 – 17:00</a:t>
             </a:r>
           </a:p>
         </p:txBody>
@@ -6567,7 +6590,7 @@
           <p:nvPr>
             <p:extLst>
               <p:ext uri="{D42A27DB-BD31-4B8C-83A1-F6EECF244321}">
-                <p14:modId xmlns:p14="http://schemas.microsoft.com/office/powerpoint/2010/main" val="1723578338"/>
+                <p14:modId xmlns:p14="http://schemas.microsoft.com/office/powerpoint/2010/main" val="2911641826"/>
               </p:ext>
             </p:extLst>
           </p:nvPr>
@@ -6751,11 +6774,21 @@
                       </a:pPr>
                       <a:r>
                         <a:rPr lang="tr-TR" sz="2000" dirty="0">
+                          <a:solidFill>
+                            <a:schemeClr val="bg1">
+                              <a:lumMod val="75000"/>
+                            </a:schemeClr>
+                          </a:solidFill>
                           <a:effectLst/>
                         </a:rPr>
                         <a:t>1.</a:t>
                       </a:r>
                       <a:endParaRPr lang="tr-TR" sz="2000" dirty="0">
+                        <a:solidFill>
+                          <a:schemeClr val="bg1">
+                            <a:lumMod val="75000"/>
+                          </a:schemeClr>
+                        </a:solidFill>
                         <a:effectLst/>
                         <a:latin typeface="Calibri" panose="020F0502020204030204" pitchFamily="34" charset="0"/>
                         <a:ea typeface="Calibri" panose="020F0502020204030204" pitchFamily="34" charset="0"/>
@@ -6780,11 +6813,21 @@
                       </a:pPr>
                       <a:r>
                         <a:rPr lang="tr-TR" sz="2000" dirty="0">
+                          <a:solidFill>
+                            <a:schemeClr val="bg1">
+                              <a:lumMod val="75000"/>
+                            </a:schemeClr>
+                          </a:solidFill>
                           <a:effectLst/>
                         </a:rPr>
                         <a:t>Python Temel</a:t>
                       </a:r>
                       <a:endParaRPr lang="tr-TR" sz="2000" dirty="0">
+                        <a:solidFill>
+                          <a:schemeClr val="bg1">
+                            <a:lumMod val="75000"/>
+                          </a:schemeClr>
+                        </a:solidFill>
                         <a:effectLst/>
                         <a:latin typeface="Calibri" panose="020F0502020204030204" pitchFamily="34" charset="0"/>
                         <a:ea typeface="Calibri" panose="020F0502020204030204" pitchFamily="34" charset="0"/>
@@ -6809,11 +6852,21 @@
                       </a:pPr>
                       <a:r>
                         <a:rPr lang="tr-TR" sz="2000" dirty="0">
+                          <a:solidFill>
+                            <a:schemeClr val="bg1">
+                              <a:lumMod val="75000"/>
+                            </a:schemeClr>
+                          </a:solidFill>
                           <a:effectLst/>
                         </a:rPr>
                         <a:t>1 GÜN</a:t>
                       </a:r>
                       <a:endParaRPr lang="tr-TR" sz="2000" dirty="0">
+                        <a:solidFill>
+                          <a:schemeClr val="bg1">
+                            <a:lumMod val="75000"/>
+                          </a:schemeClr>
+                        </a:solidFill>
                         <a:effectLst/>
                         <a:latin typeface="Calibri" panose="020F0502020204030204" pitchFamily="34" charset="0"/>
                         <a:ea typeface="Calibri" panose="020F0502020204030204" pitchFamily="34" charset="0"/>
@@ -6838,11 +6891,21 @@
                       </a:pPr>
                       <a:r>
                         <a:rPr lang="tr-TR" sz="2000">
+                          <a:solidFill>
+                            <a:schemeClr val="bg1">
+                              <a:lumMod val="75000"/>
+                            </a:schemeClr>
+                          </a:solidFill>
                           <a:effectLst/>
                         </a:rPr>
                         <a:t>15-16 Mayıs 2019</a:t>
                       </a:r>
                       <a:endParaRPr lang="tr-TR" sz="2000">
+                        <a:solidFill>
+                          <a:schemeClr val="bg1">
+                            <a:lumMod val="75000"/>
+                          </a:schemeClr>
+                        </a:solidFill>
                         <a:effectLst/>
                         <a:latin typeface="Calibri" panose="020F0502020204030204" pitchFamily="34" charset="0"/>
                         <a:ea typeface="Calibri" panose="020F0502020204030204" pitchFamily="34" charset="0"/>
@@ -6874,11 +6937,21 @@
                       </a:pPr>
                       <a:r>
                         <a:rPr lang="tr-TR" sz="2000">
+                          <a:solidFill>
+                            <a:schemeClr val="bg1">
+                              <a:lumMod val="75000"/>
+                            </a:schemeClr>
+                          </a:solidFill>
                           <a:effectLst/>
                         </a:rPr>
                         <a:t>2.</a:t>
                       </a:r>
                       <a:endParaRPr lang="tr-TR" sz="2000">
+                        <a:solidFill>
+                          <a:schemeClr val="bg1">
+                            <a:lumMod val="75000"/>
+                          </a:schemeClr>
+                        </a:solidFill>
                         <a:effectLst/>
                         <a:latin typeface="Calibri" panose="020F0502020204030204" pitchFamily="34" charset="0"/>
                         <a:ea typeface="Calibri" panose="020F0502020204030204" pitchFamily="34" charset="0"/>
@@ -6903,17 +6976,32 @@
                       </a:pPr>
                       <a:r>
                         <a:rPr lang="tr-TR" sz="2000" dirty="0">
+                          <a:solidFill>
+                            <a:schemeClr val="bg1">
+                              <a:lumMod val="75000"/>
+                            </a:schemeClr>
+                          </a:solidFill>
                           <a:effectLst/>
                         </a:rPr>
                         <a:t>Data Analysis (Veri Analizi) </a:t>
                       </a:r>
                       <a:r>
                         <a:rPr lang="tr-TR" sz="2000" dirty="0" err="1">
+                          <a:solidFill>
+                            <a:schemeClr val="bg1">
+                              <a:lumMod val="75000"/>
+                            </a:schemeClr>
+                          </a:solidFill>
                           <a:effectLst/>
                         </a:rPr>
                         <a:t>Pandas</a:t>
                       </a:r>
                       <a:endParaRPr lang="tr-TR" sz="2000" dirty="0">
+                        <a:solidFill>
+                          <a:schemeClr val="bg1">
+                            <a:lumMod val="75000"/>
+                          </a:schemeClr>
+                        </a:solidFill>
                         <a:effectLst/>
                       </a:endParaRPr>
                     </a:p>
@@ -6935,11 +7023,21 @@
                       </a:pPr>
                       <a:r>
                         <a:rPr lang="tr-TR" sz="2000" dirty="0">
+                          <a:solidFill>
+                            <a:schemeClr val="bg1">
+                              <a:lumMod val="75000"/>
+                            </a:schemeClr>
+                          </a:solidFill>
                           <a:effectLst/>
                         </a:rPr>
                         <a:t>1 GÜN</a:t>
                       </a:r>
                       <a:endParaRPr lang="tr-TR" sz="2000" dirty="0">
+                        <a:solidFill>
+                          <a:schemeClr val="bg1">
+                            <a:lumMod val="75000"/>
+                          </a:schemeClr>
+                        </a:solidFill>
                         <a:effectLst/>
                         <a:latin typeface="Calibri" panose="020F0502020204030204" pitchFamily="34" charset="0"/>
                         <a:ea typeface="Calibri" panose="020F0502020204030204" pitchFamily="34" charset="0"/>
@@ -6964,11 +7062,21 @@
                       </a:pPr>
                       <a:r>
                         <a:rPr lang="tr-TR" sz="2000">
+                          <a:solidFill>
+                            <a:schemeClr val="bg1">
+                              <a:lumMod val="75000"/>
+                            </a:schemeClr>
+                          </a:solidFill>
                           <a:effectLst/>
                         </a:rPr>
                         <a:t>15-16 Mayıs 2019</a:t>
                       </a:r>
                       <a:endParaRPr lang="tr-TR" sz="2000">
+                        <a:solidFill>
+                          <a:schemeClr val="bg1">
+                            <a:lumMod val="75000"/>
+                          </a:schemeClr>
+                        </a:solidFill>
                         <a:effectLst/>
                         <a:latin typeface="Calibri" panose="020F0502020204030204" pitchFamily="34" charset="0"/>
                         <a:ea typeface="Calibri" panose="020F0502020204030204" pitchFamily="34" charset="0"/>
@@ -7000,11 +7108,21 @@
                       </a:pPr>
                       <a:r>
                         <a:rPr lang="tr-TR" sz="2000">
+                          <a:solidFill>
+                            <a:schemeClr val="bg1">
+                              <a:lumMod val="75000"/>
+                            </a:schemeClr>
+                          </a:solidFill>
                           <a:effectLst/>
                         </a:rPr>
                         <a:t>3.</a:t>
                       </a:r>
                       <a:endParaRPr lang="tr-TR" sz="2000">
+                        <a:solidFill>
+                          <a:schemeClr val="bg1">
+                            <a:lumMod val="75000"/>
+                          </a:schemeClr>
+                        </a:solidFill>
                         <a:effectLst/>
                         <a:latin typeface="Calibri" panose="020F0502020204030204" pitchFamily="34" charset="0"/>
                         <a:ea typeface="Calibri" panose="020F0502020204030204" pitchFamily="34" charset="0"/>
@@ -7029,53 +7147,98 @@
                       </a:pPr>
                       <a:r>
                         <a:rPr lang="tr-TR" sz="2000" dirty="0">
+                          <a:solidFill>
+                            <a:schemeClr val="bg1">
+                              <a:lumMod val="75000"/>
+                            </a:schemeClr>
+                          </a:solidFill>
                           <a:effectLst/>
                         </a:rPr>
                         <a:t>Data Analysis </a:t>
                       </a:r>
                       <a:r>
                         <a:rPr lang="tr-TR" sz="2000" dirty="0" err="1">
+                          <a:solidFill>
+                            <a:schemeClr val="bg1">
+                              <a:lumMod val="75000"/>
+                            </a:schemeClr>
+                          </a:solidFill>
                           <a:effectLst/>
                         </a:rPr>
                         <a:t>and</a:t>
                       </a:r>
                       <a:r>
                         <a:rPr lang="tr-TR" sz="2000" dirty="0">
+                          <a:solidFill>
+                            <a:schemeClr val="bg1">
+                              <a:lumMod val="75000"/>
+                            </a:schemeClr>
+                          </a:solidFill>
                           <a:effectLst/>
                         </a:rPr>
                         <a:t> </a:t>
                       </a:r>
                       <a:r>
                         <a:rPr lang="tr-TR" sz="2000" dirty="0" err="1">
+                          <a:solidFill>
+                            <a:schemeClr val="bg1">
+                              <a:lumMod val="75000"/>
+                            </a:schemeClr>
+                          </a:solidFill>
                           <a:effectLst/>
                         </a:rPr>
                         <a:t>Visualization</a:t>
                       </a:r>
                       <a:r>
                         <a:rPr lang="tr-TR" sz="2000" dirty="0">
+                          <a:solidFill>
+                            <a:schemeClr val="bg1">
+                              <a:lumMod val="75000"/>
+                            </a:schemeClr>
+                          </a:solidFill>
                           <a:effectLst/>
                         </a:rPr>
                         <a:t> (Veri Analizi ve Görselleştirme) </a:t>
                       </a:r>
                       <a:r>
                         <a:rPr lang="tr-TR" sz="2000" dirty="0" err="1">
+                          <a:solidFill>
+                            <a:schemeClr val="bg1">
+                              <a:lumMod val="75000"/>
+                            </a:schemeClr>
+                          </a:solidFill>
                           <a:effectLst/>
                         </a:rPr>
                         <a:t>Pandas</a:t>
                       </a:r>
                       <a:r>
                         <a:rPr lang="tr-TR" sz="2000" dirty="0">
+                          <a:solidFill>
+                            <a:schemeClr val="bg1">
+                              <a:lumMod val="75000"/>
+                            </a:schemeClr>
+                          </a:solidFill>
                           <a:effectLst/>
                         </a:rPr>
                         <a:t> - </a:t>
                       </a:r>
                       <a:r>
                         <a:rPr lang="tr-TR" sz="2000" dirty="0" err="1">
+                          <a:solidFill>
+                            <a:schemeClr val="bg1">
+                              <a:lumMod val="75000"/>
+                            </a:schemeClr>
+                          </a:solidFill>
                           <a:effectLst/>
                         </a:rPr>
                         <a:t>Matplotlib</a:t>
                       </a:r>
                       <a:endParaRPr lang="tr-TR" sz="2000" dirty="0">
+                        <a:solidFill>
+                          <a:schemeClr val="bg1">
+                            <a:lumMod val="75000"/>
+                          </a:schemeClr>
+                        </a:solidFill>
                         <a:effectLst/>
                       </a:endParaRPr>
                     </a:p>
@@ -7097,11 +7260,21 @@
                       </a:pPr>
                       <a:r>
                         <a:rPr lang="tr-TR" sz="2000">
+                          <a:solidFill>
+                            <a:schemeClr val="bg1">
+                              <a:lumMod val="75000"/>
+                            </a:schemeClr>
+                          </a:solidFill>
                           <a:effectLst/>
                         </a:rPr>
                         <a:t>1 GÜN</a:t>
                       </a:r>
                       <a:endParaRPr lang="tr-TR" sz="2000">
+                        <a:solidFill>
+                          <a:schemeClr val="bg1">
+                            <a:lumMod val="75000"/>
+                          </a:schemeClr>
+                        </a:solidFill>
                         <a:effectLst/>
                         <a:latin typeface="Calibri" panose="020F0502020204030204" pitchFamily="34" charset="0"/>
                         <a:ea typeface="Calibri" panose="020F0502020204030204" pitchFamily="34" charset="0"/>
@@ -7126,11 +7299,21 @@
                       </a:pPr>
                       <a:r>
                         <a:rPr lang="tr-TR" sz="2000">
+                          <a:solidFill>
+                            <a:schemeClr val="bg1">
+                              <a:lumMod val="75000"/>
+                            </a:schemeClr>
+                          </a:solidFill>
                           <a:effectLst/>
                         </a:rPr>
                         <a:t>22-24 Mayıs 2019</a:t>
                       </a:r>
                       <a:endParaRPr lang="tr-TR" sz="2000">
+                        <a:solidFill>
+                          <a:schemeClr val="bg1">
+                            <a:lumMod val="75000"/>
+                          </a:schemeClr>
+                        </a:solidFill>
                         <a:effectLst/>
                         <a:latin typeface="Calibri" panose="020F0502020204030204" pitchFamily="34" charset="0"/>
                         <a:ea typeface="Calibri" panose="020F0502020204030204" pitchFamily="34" charset="0"/>
@@ -7162,11 +7345,21 @@
                       </a:pPr>
                       <a:r>
                         <a:rPr lang="tr-TR" sz="2000">
+                          <a:solidFill>
+                            <a:schemeClr val="bg1">
+                              <a:lumMod val="75000"/>
+                            </a:schemeClr>
+                          </a:solidFill>
                           <a:effectLst/>
                         </a:rPr>
                         <a:t>4.</a:t>
                       </a:r>
                       <a:endParaRPr lang="tr-TR" sz="2000">
+                        <a:solidFill>
+                          <a:schemeClr val="bg1">
+                            <a:lumMod val="75000"/>
+                          </a:schemeClr>
+                        </a:solidFill>
                         <a:effectLst/>
                         <a:latin typeface="Calibri" panose="020F0502020204030204" pitchFamily="34" charset="0"/>
                         <a:ea typeface="Calibri" panose="020F0502020204030204" pitchFamily="34" charset="0"/>
@@ -7200,23 +7393,43 @@
                       </a:pPr>
                       <a:r>
                         <a:rPr lang="tr-TR" sz="2000" dirty="0">
+                          <a:solidFill>
+                            <a:schemeClr val="bg1">
+                              <a:lumMod val="75000"/>
+                            </a:schemeClr>
+                          </a:solidFill>
                           <a:effectLst/>
                         </a:rPr>
                         <a:t>Data </a:t>
                       </a:r>
                       <a:r>
                         <a:rPr lang="tr-TR" sz="2000" dirty="0" err="1">
+                          <a:solidFill>
+                            <a:schemeClr val="bg1">
+                              <a:lumMod val="75000"/>
+                            </a:schemeClr>
+                          </a:solidFill>
                           <a:effectLst/>
                         </a:rPr>
                         <a:t>Preprocessing</a:t>
                       </a:r>
                       <a:r>
                         <a:rPr lang="tr-TR" sz="2000" dirty="0">
+                          <a:solidFill>
+                            <a:schemeClr val="bg1">
+                              <a:lumMod val="75000"/>
+                            </a:schemeClr>
+                          </a:solidFill>
                           <a:effectLst/>
                         </a:rPr>
                         <a:t> (Veri Ön İşleme)</a:t>
                       </a:r>
                       <a:endParaRPr lang="tr-TR" sz="2000" dirty="0">
+                        <a:solidFill>
+                          <a:schemeClr val="bg1">
+                            <a:lumMod val="75000"/>
+                          </a:schemeClr>
+                        </a:solidFill>
                         <a:effectLst/>
                         <a:latin typeface="Calibri" panose="020F0502020204030204" pitchFamily="34" charset="0"/>
                         <a:ea typeface="Calibri" panose="020F0502020204030204" pitchFamily="34" charset="0"/>
@@ -7234,18 +7447,33 @@
                       </a:pPr>
                       <a:r>
                         <a:rPr lang="tr-TR" sz="2000" dirty="0">
+                          <a:solidFill>
+                            <a:schemeClr val="bg1">
+                              <a:lumMod val="75000"/>
+                            </a:schemeClr>
+                          </a:solidFill>
                           <a:effectLst/>
                         </a:rPr>
                         <a:t>Data </a:t>
                       </a:r>
                       <a:r>
                         <a:rPr lang="tr-TR" sz="2000" dirty="0" err="1">
+                          <a:solidFill>
+                            <a:schemeClr val="bg1">
+                              <a:lumMod val="75000"/>
+                            </a:schemeClr>
+                          </a:solidFill>
                           <a:effectLst/>
                         </a:rPr>
                         <a:t>Cleaning</a:t>
                       </a:r>
                       <a:r>
                         <a:rPr lang="tr-TR" sz="2000" dirty="0">
+                          <a:solidFill>
+                            <a:schemeClr val="bg1">
+                              <a:lumMod val="75000"/>
+                            </a:schemeClr>
+                          </a:solidFill>
                           <a:effectLst/>
                         </a:rPr>
                         <a:t> (Veri Temizleme)</a:t>
@@ -7271,59 +7499,109 @@
                       </a:pPr>
                       <a:r>
                         <a:rPr lang="tr-TR" sz="2000" dirty="0">
+                          <a:solidFill>
+                            <a:schemeClr val="bg1">
+                              <a:lumMod val="75000"/>
+                            </a:schemeClr>
+                          </a:solidFill>
                           <a:effectLst/>
                         </a:rPr>
                         <a:t>ETL (</a:t>
                       </a:r>
                       <a:r>
                         <a:rPr lang="tr-TR" sz="2000" dirty="0" err="1">
+                          <a:solidFill>
+                            <a:schemeClr val="bg1">
+                              <a:lumMod val="75000"/>
+                            </a:schemeClr>
+                          </a:solidFill>
                           <a:effectLst/>
                         </a:rPr>
                         <a:t>Extract</a:t>
                       </a:r>
                       <a:r>
                         <a:rPr lang="tr-TR" sz="2000" dirty="0">
+                          <a:solidFill>
+                            <a:schemeClr val="bg1">
+                              <a:lumMod val="75000"/>
+                            </a:schemeClr>
+                          </a:solidFill>
                           <a:effectLst/>
                         </a:rPr>
                         <a:t>, </a:t>
                       </a:r>
                       <a:r>
                         <a:rPr lang="tr-TR" sz="2000" dirty="0" err="1">
+                          <a:solidFill>
+                            <a:schemeClr val="bg1">
+                              <a:lumMod val="75000"/>
+                            </a:schemeClr>
+                          </a:solidFill>
                           <a:effectLst/>
                         </a:rPr>
                         <a:t>Transform</a:t>
                       </a:r>
                       <a:r>
                         <a:rPr lang="tr-TR" sz="2000" dirty="0">
+                          <a:solidFill>
+                            <a:schemeClr val="bg1">
+                              <a:lumMod val="75000"/>
+                            </a:schemeClr>
+                          </a:solidFill>
                           <a:effectLst/>
                         </a:rPr>
                         <a:t> </a:t>
                       </a:r>
                       <a:r>
                         <a:rPr lang="tr-TR" sz="2000" dirty="0" err="1">
+                          <a:solidFill>
+                            <a:schemeClr val="bg1">
+                              <a:lumMod val="75000"/>
+                            </a:schemeClr>
+                          </a:solidFill>
                           <a:effectLst/>
                         </a:rPr>
                         <a:t>and</a:t>
                       </a:r>
                       <a:r>
                         <a:rPr lang="tr-TR" sz="2000" dirty="0">
+                          <a:solidFill>
+                            <a:schemeClr val="bg1">
+                              <a:lumMod val="75000"/>
+                            </a:schemeClr>
+                          </a:solidFill>
                           <a:effectLst/>
                         </a:rPr>
                         <a:t> </a:t>
                       </a:r>
                       <a:r>
                         <a:rPr lang="tr-TR" sz="2000" dirty="0" err="1">
+                          <a:solidFill>
+                            <a:schemeClr val="bg1">
+                              <a:lumMod val="75000"/>
+                            </a:schemeClr>
+                          </a:solidFill>
                           <a:effectLst/>
                         </a:rPr>
                         <a:t>Load</a:t>
                       </a:r>
                       <a:r>
                         <a:rPr lang="tr-TR" sz="2000" dirty="0">
+                          <a:solidFill>
+                            <a:schemeClr val="bg1">
+                              <a:lumMod val="75000"/>
+                            </a:schemeClr>
+                          </a:solidFill>
                           <a:effectLst/>
                         </a:rPr>
                         <a:t>)</a:t>
                       </a:r>
                       <a:endParaRPr lang="tr-TR" sz="2000" dirty="0">
+                        <a:solidFill>
+                          <a:schemeClr val="bg1">
+                            <a:lumMod val="75000"/>
+                          </a:schemeClr>
+                        </a:solidFill>
                         <a:effectLst/>
                         <a:latin typeface="Calibri" panose="020F0502020204030204" pitchFamily="34" charset="0"/>
                         <a:ea typeface="Calibri" panose="020F0502020204030204" pitchFamily="34" charset="0"/>
@@ -7347,12 +7625,22 @@
                         </a:spcAft>
                       </a:pPr>
                       <a:r>
-                        <a:rPr lang="tr-TR" sz="2000">
+                        <a:rPr lang="tr-TR" sz="2000" dirty="0">
+                          <a:solidFill>
+                            <a:schemeClr val="bg1">
+                              <a:lumMod val="75000"/>
+                            </a:schemeClr>
+                          </a:solidFill>
                           <a:effectLst/>
                         </a:rPr>
                         <a:t>2 GÜN</a:t>
                       </a:r>
-                      <a:endParaRPr lang="tr-TR" sz="2000">
+                      <a:endParaRPr lang="tr-TR" sz="2000" dirty="0">
+                        <a:solidFill>
+                          <a:schemeClr val="bg1">
+                            <a:lumMod val="75000"/>
+                          </a:schemeClr>
+                        </a:solidFill>
                         <a:effectLst/>
                         <a:latin typeface="Calibri" panose="020F0502020204030204" pitchFamily="34" charset="0"/>
                         <a:ea typeface="Calibri" panose="020F0502020204030204" pitchFamily="34" charset="0"/>
@@ -7376,12 +7664,22 @@
                         </a:spcAft>
                       </a:pPr>
                       <a:r>
-                        <a:rPr lang="tr-TR" sz="2000">
+                        <a:rPr lang="tr-TR" sz="2000" dirty="0">
+                          <a:solidFill>
+                            <a:schemeClr val="bg1">
+                              <a:lumMod val="75000"/>
+                            </a:schemeClr>
+                          </a:solidFill>
                           <a:effectLst/>
                         </a:rPr>
                         <a:t>22-24 Mayıs 2019</a:t>
                       </a:r>
-                      <a:endParaRPr lang="tr-TR" sz="2000">
+                      <a:endParaRPr lang="tr-TR" sz="2000" dirty="0">
+                        <a:solidFill>
+                          <a:schemeClr val="bg1">
+                            <a:lumMod val="75000"/>
+                          </a:schemeClr>
+                        </a:solidFill>
                         <a:effectLst/>
                         <a:latin typeface="Calibri" panose="020F0502020204030204" pitchFamily="34" charset="0"/>
                         <a:ea typeface="Calibri" panose="020F0502020204030204" pitchFamily="34" charset="0"/>
@@ -7502,7 +7800,7 @@
                         <a:rPr lang="tr-TR" sz="2000" dirty="0">
                           <a:effectLst/>
                         </a:rPr>
-                        <a:t>02 ve 04 Temmuz 2019</a:t>
+                        <a:t>02, 04, 09 Temmuz 2019</a:t>
                       </a:r>
                       <a:endParaRPr lang="tr-TR" sz="2000" dirty="0">
                         <a:effectLst/>
@@ -7625,7 +7923,7 @@
                         <a:rPr lang="tr-TR" sz="2000" dirty="0">
                           <a:effectLst/>
                         </a:rPr>
-                        <a:t>09-11 Temmuz 2019</a:t>
+                        <a:t>10 Temmuz 2019</a:t>
                       </a:r>
                       <a:endParaRPr lang="tr-TR" sz="2000" dirty="0">
                         <a:effectLst/>
@@ -7748,23 +8046,7 @@
                         <a:rPr lang="tr-TR" sz="2000" dirty="0">
                           <a:effectLst/>
                         </a:rPr>
-                        <a:t>09-11 Temmuz 2019</a:t>
-                      </a:r>
-                    </a:p>
-                    <a:p>
-                      <a:pPr algn="r">
-                        <a:lnSpc>
-                          <a:spcPct val="107000"/>
-                        </a:lnSpc>
-                        <a:spcAft>
-                          <a:spcPts val="0"/>
-                        </a:spcAft>
-                      </a:pPr>
-                      <a:r>
-                        <a:rPr lang="tr-TR" sz="2000" dirty="0">
-                          <a:effectLst/>
-                        </a:rPr>
-                        <a:t>16-17 Temmuz 2019</a:t>
+                        <a:t>11, 16, 17 Temmuz 2019</a:t>
                       </a:r>
                       <a:endParaRPr lang="tr-TR" sz="2000" dirty="0">
                         <a:effectLst/>

</xml_diff>

<commit_message>
python venv ve tensorflow kurulumları güncellendi
</commit_message>
<xml_diff>
--- a/acilis_sunumu.pptx
+++ b/acilis_sunumu.pptx
@@ -138,7 +138,7 @@
   <pc:docChgLst>
     <pc:chgData name="Erkan ŞİRİN" userId="7f10ce1d6aaf8c5d" providerId="LiveId" clId="{1BFD029C-DFCC-425B-8851-621E66778794}"/>
     <pc:docChg chg="custSel addSld modSld">
-      <pc:chgData name="Erkan ŞİRİN" userId="7f10ce1d6aaf8c5d" providerId="LiveId" clId="{1BFD029C-DFCC-425B-8851-621E66778794}" dt="2019-07-23T06:08:03.694" v="82" actId="108"/>
+      <pc:chgData name="Erkan ŞİRİN" userId="7f10ce1d6aaf8c5d" providerId="LiveId" clId="{1BFD029C-DFCC-425B-8851-621E66778794}" dt="2019-07-26T08:28:47.370" v="91" actId="20577"/>
       <pc:docMkLst>
         <pc:docMk/>
       </pc:docMkLst>
@@ -181,13 +181,13 @@
         </pc:graphicFrameChg>
       </pc:sldChg>
       <pc:sldChg chg="modSp">
-        <pc:chgData name="Erkan ŞİRİN" userId="7f10ce1d6aaf8c5d" providerId="LiveId" clId="{1BFD029C-DFCC-425B-8851-621E66778794}" dt="2019-07-23T06:08:03.694" v="82" actId="108"/>
+        <pc:chgData name="Erkan ŞİRİN" userId="7f10ce1d6aaf8c5d" providerId="LiveId" clId="{1BFD029C-DFCC-425B-8851-621E66778794}" dt="2019-07-26T08:28:47.370" v="91" actId="20577"/>
         <pc:sldMkLst>
           <pc:docMk/>
           <pc:sldMk cId="2360627406" sldId="334"/>
         </pc:sldMkLst>
         <pc:graphicFrameChg chg="mod modGraphic">
-          <ac:chgData name="Erkan ŞİRİN" userId="7f10ce1d6aaf8c5d" providerId="LiveId" clId="{1BFD029C-DFCC-425B-8851-621E66778794}" dt="2019-07-23T06:08:03.694" v="82" actId="108"/>
+          <ac:chgData name="Erkan ŞİRİN" userId="7f10ce1d6aaf8c5d" providerId="LiveId" clId="{1BFD029C-DFCC-425B-8851-621E66778794}" dt="2019-07-26T08:28:47.370" v="91" actId="20577"/>
           <ac:graphicFrameMkLst>
             <pc:docMk/>
             <pc:sldMk cId="2360627406" sldId="334"/>
@@ -662,7 +662,7 @@
           <a:p>
             <a:fld id="{BAB971F1-0A24-473E-8A66-D77E329B588E}" type="datetimeFigureOut">
               <a:rPr lang="tr-TR" smtClean="0"/>
-              <a:t>23.07.2019</a:t>
+              <a:t>26.07.2019</a:t>
             </a:fld>
             <a:endParaRPr lang="tr-TR"/>
           </a:p>
@@ -860,7 +860,7 @@
           <a:p>
             <a:fld id="{BAB971F1-0A24-473E-8A66-D77E329B588E}" type="datetimeFigureOut">
               <a:rPr lang="tr-TR" smtClean="0"/>
-              <a:t>23.07.2019</a:t>
+              <a:t>26.07.2019</a:t>
             </a:fld>
             <a:endParaRPr lang="tr-TR"/>
           </a:p>
@@ -1068,7 +1068,7 @@
           <a:p>
             <a:fld id="{BAB971F1-0A24-473E-8A66-D77E329B588E}" type="datetimeFigureOut">
               <a:rPr lang="tr-TR" smtClean="0"/>
-              <a:t>23.07.2019</a:t>
+              <a:t>26.07.2019</a:t>
             </a:fld>
             <a:endParaRPr lang="tr-TR"/>
           </a:p>
@@ -1266,7 +1266,7 @@
           <a:p>
             <a:fld id="{BAB971F1-0A24-473E-8A66-D77E329B588E}" type="datetimeFigureOut">
               <a:rPr lang="tr-TR" smtClean="0"/>
-              <a:t>23.07.2019</a:t>
+              <a:t>26.07.2019</a:t>
             </a:fld>
             <a:endParaRPr lang="tr-TR"/>
           </a:p>
@@ -1541,7 +1541,7 @@
           <a:p>
             <a:fld id="{BAB971F1-0A24-473E-8A66-D77E329B588E}" type="datetimeFigureOut">
               <a:rPr lang="tr-TR" smtClean="0"/>
-              <a:t>23.07.2019</a:t>
+              <a:t>26.07.2019</a:t>
             </a:fld>
             <a:endParaRPr lang="tr-TR"/>
           </a:p>
@@ -1806,7 +1806,7 @@
           <a:p>
             <a:fld id="{BAB971F1-0A24-473E-8A66-D77E329B588E}" type="datetimeFigureOut">
               <a:rPr lang="tr-TR" smtClean="0"/>
-              <a:t>23.07.2019</a:t>
+              <a:t>26.07.2019</a:t>
             </a:fld>
             <a:endParaRPr lang="tr-TR"/>
           </a:p>
@@ -2218,7 +2218,7 @@
           <a:p>
             <a:fld id="{BAB971F1-0A24-473E-8A66-D77E329B588E}" type="datetimeFigureOut">
               <a:rPr lang="tr-TR" smtClean="0"/>
-              <a:t>23.07.2019</a:t>
+              <a:t>26.07.2019</a:t>
             </a:fld>
             <a:endParaRPr lang="tr-TR"/>
           </a:p>
@@ -2359,7 +2359,7 @@
           <a:p>
             <a:fld id="{BAB971F1-0A24-473E-8A66-D77E329B588E}" type="datetimeFigureOut">
               <a:rPr lang="tr-TR" smtClean="0"/>
-              <a:t>23.07.2019</a:t>
+              <a:t>26.07.2019</a:t>
             </a:fld>
             <a:endParaRPr lang="tr-TR"/>
           </a:p>
@@ -2472,7 +2472,7 @@
           <a:p>
             <a:fld id="{BAB971F1-0A24-473E-8A66-D77E329B588E}" type="datetimeFigureOut">
               <a:rPr lang="tr-TR" smtClean="0"/>
-              <a:t>23.07.2019</a:t>
+              <a:t>26.07.2019</a:t>
             </a:fld>
             <a:endParaRPr lang="tr-TR"/>
           </a:p>
@@ -2783,7 +2783,7 @@
           <a:p>
             <a:fld id="{BAB971F1-0A24-473E-8A66-D77E329B588E}" type="datetimeFigureOut">
               <a:rPr lang="tr-TR" smtClean="0"/>
-              <a:t>23.07.2019</a:t>
+              <a:t>26.07.2019</a:t>
             </a:fld>
             <a:endParaRPr lang="tr-TR"/>
           </a:p>
@@ -3071,7 +3071,7 @@
           <a:p>
             <a:fld id="{BAB971F1-0A24-473E-8A66-D77E329B588E}" type="datetimeFigureOut">
               <a:rPr lang="tr-TR" smtClean="0"/>
-              <a:t>23.07.2019</a:t>
+              <a:t>26.07.2019</a:t>
             </a:fld>
             <a:endParaRPr lang="tr-TR"/>
           </a:p>
@@ -3312,7 +3312,7 @@
           <a:p>
             <a:fld id="{BAB971F1-0A24-473E-8A66-D77E329B588E}" type="datetimeFigureOut">
               <a:rPr lang="tr-TR" smtClean="0"/>
-              <a:t>23.07.2019</a:t>
+              <a:t>26.07.2019</a:t>
             </a:fld>
             <a:endParaRPr lang="tr-TR"/>
           </a:p>
@@ -7327,7 +7327,7 @@
           <p:nvPr>
             <p:extLst>
               <p:ext uri="{D42A27DB-BD31-4B8C-83A1-F6EECF244321}">
-                <p14:modId xmlns:p14="http://schemas.microsoft.com/office/powerpoint/2010/main" val="2130679386"/>
+                <p14:modId xmlns:p14="http://schemas.microsoft.com/office/powerpoint/2010/main" val="4003769993"/>
               </p:ext>
             </p:extLst>
           </p:nvPr>
@@ -7510,27 +7510,17 @@
                         </a:spcAft>
                       </a:pPr>
                       <a:r>
-                        <a:rPr lang="tr-TR" sz="2000" dirty="0">
+                        <a:rPr lang="tr-TR" sz="2000" kern="1200" dirty="0">
                           <a:solidFill>
-                            <a:schemeClr val="bg1">
-                              <a:lumMod val="75000"/>
-                            </a:schemeClr>
+                            <a:schemeClr val="tx1"/>
                           </a:solidFill>
                           <a:effectLst/>
+                          <a:latin typeface="+mn-lt"/>
+                          <a:ea typeface="+mn-ea"/>
+                          <a:cs typeface="+mn-cs"/>
                         </a:rPr>
                         <a:t>1.</a:t>
                       </a:r>
-                      <a:endParaRPr lang="tr-TR" sz="2000" dirty="0">
-                        <a:solidFill>
-                          <a:schemeClr val="bg1">
-                            <a:lumMod val="75000"/>
-                          </a:schemeClr>
-                        </a:solidFill>
-                        <a:effectLst/>
-                        <a:latin typeface="Calibri" panose="020F0502020204030204" pitchFamily="34" charset="0"/>
-                        <a:ea typeface="Calibri" panose="020F0502020204030204" pitchFamily="34" charset="0"/>
-                        <a:cs typeface="Times New Roman" panose="02020603050405020304" pitchFamily="18" charset="0"/>
-                      </a:endParaRPr>
                     </a:p>
                   </a:txBody>
                   <a:tcPr marL="68580" marR="68580" marT="0" marB="0" anchor="ctr"/>
@@ -7549,27 +7539,17 @@
                         </a:spcAft>
                       </a:pPr>
                       <a:r>
-                        <a:rPr lang="tr-TR" sz="2000" dirty="0">
+                        <a:rPr lang="tr-TR" sz="2000" kern="1200" dirty="0">
                           <a:solidFill>
-                            <a:schemeClr val="bg1">
-                              <a:lumMod val="75000"/>
-                            </a:schemeClr>
+                            <a:schemeClr val="tx1"/>
                           </a:solidFill>
                           <a:effectLst/>
+                          <a:latin typeface="+mn-lt"/>
+                          <a:ea typeface="+mn-ea"/>
+                          <a:cs typeface="+mn-cs"/>
                         </a:rPr>
                         <a:t>Python Temel</a:t>
                       </a:r>
-                      <a:endParaRPr lang="tr-TR" sz="2000" dirty="0">
-                        <a:solidFill>
-                          <a:schemeClr val="bg1">
-                            <a:lumMod val="75000"/>
-                          </a:schemeClr>
-                        </a:solidFill>
-                        <a:effectLst/>
-                        <a:latin typeface="Calibri" panose="020F0502020204030204" pitchFamily="34" charset="0"/>
-                        <a:ea typeface="Calibri" panose="020F0502020204030204" pitchFamily="34" charset="0"/>
-                        <a:cs typeface="Times New Roman" panose="02020603050405020304" pitchFamily="18" charset="0"/>
-                      </a:endParaRPr>
                     </a:p>
                   </a:txBody>
                   <a:tcPr marL="68580" marR="68580" marT="0" marB="0" anchor="ctr"/>
@@ -7588,27 +7568,17 @@
                         </a:spcAft>
                       </a:pPr>
                       <a:r>
-                        <a:rPr lang="tr-TR" sz="2000" dirty="0">
+                        <a:rPr lang="tr-TR" sz="2000" kern="1200" dirty="0">
                           <a:solidFill>
-                            <a:schemeClr val="bg1">
-                              <a:lumMod val="75000"/>
-                            </a:schemeClr>
+                            <a:schemeClr val="tx1"/>
                           </a:solidFill>
                           <a:effectLst/>
+                          <a:latin typeface="+mn-lt"/>
+                          <a:ea typeface="+mn-ea"/>
+                          <a:cs typeface="+mn-cs"/>
                         </a:rPr>
                         <a:t>1 GÜN</a:t>
                       </a:r>
-                      <a:endParaRPr lang="tr-TR" sz="2000" dirty="0">
-                        <a:solidFill>
-                          <a:schemeClr val="bg1">
-                            <a:lumMod val="75000"/>
-                          </a:schemeClr>
-                        </a:solidFill>
-                        <a:effectLst/>
-                        <a:latin typeface="Calibri" panose="020F0502020204030204" pitchFamily="34" charset="0"/>
-                        <a:ea typeface="Calibri" panose="020F0502020204030204" pitchFamily="34" charset="0"/>
-                        <a:cs typeface="Times New Roman" panose="02020603050405020304" pitchFamily="18" charset="0"/>
-                      </a:endParaRPr>
                     </a:p>
                   </a:txBody>
                   <a:tcPr marL="68580" marR="68580" marT="0" marB="0" anchor="ctr"/>
@@ -7627,27 +7597,17 @@
                         </a:spcAft>
                       </a:pPr>
                       <a:r>
-                        <a:rPr lang="tr-TR" sz="2000">
+                        <a:rPr lang="tr-TR" sz="2000" kern="1200" dirty="0">
                           <a:solidFill>
-                            <a:schemeClr val="bg1">
-                              <a:lumMod val="75000"/>
-                            </a:schemeClr>
+                            <a:schemeClr val="tx1"/>
                           </a:solidFill>
                           <a:effectLst/>
-                        </a:rPr>
-                        <a:t>15-16 Mayıs 2019</a:t>
-                      </a:r>
-                      <a:endParaRPr lang="tr-TR" sz="2000">
-                        <a:solidFill>
-                          <a:schemeClr val="bg1">
-                            <a:lumMod val="75000"/>
-                          </a:schemeClr>
-                        </a:solidFill>
-                        <a:effectLst/>
-                        <a:latin typeface="Calibri" panose="020F0502020204030204" pitchFamily="34" charset="0"/>
-                        <a:ea typeface="Calibri" panose="020F0502020204030204" pitchFamily="34" charset="0"/>
-                        <a:cs typeface="Times New Roman" panose="02020603050405020304" pitchFamily="18" charset="0"/>
-                      </a:endParaRPr>
+                          <a:latin typeface="+mn-lt"/>
+                          <a:ea typeface="+mn-ea"/>
+                          <a:cs typeface="+mn-cs"/>
+                        </a:rPr>
+                        <a:t>15 Mayıs 2019</a:t>
+                      </a:r>
                     </a:p>
                   </a:txBody>
                   <a:tcPr marL="68580" marR="68580" marT="0" marB="0" anchor="ctr"/>
@@ -7673,27 +7633,17 @@
                         </a:spcAft>
                       </a:pPr>
                       <a:r>
-                        <a:rPr lang="tr-TR" sz="2000">
+                        <a:rPr lang="tr-TR" sz="2000" kern="1200">
                           <a:solidFill>
-                            <a:schemeClr val="bg1">
-                              <a:lumMod val="75000"/>
-                            </a:schemeClr>
+                            <a:schemeClr val="tx1"/>
                           </a:solidFill>
                           <a:effectLst/>
+                          <a:latin typeface="+mn-lt"/>
+                          <a:ea typeface="+mn-ea"/>
+                          <a:cs typeface="+mn-cs"/>
                         </a:rPr>
                         <a:t>2.</a:t>
                       </a:r>
-                      <a:endParaRPr lang="tr-TR" sz="2000">
-                        <a:solidFill>
-                          <a:schemeClr val="bg1">
-                            <a:lumMod val="75000"/>
-                          </a:schemeClr>
-                        </a:solidFill>
-                        <a:effectLst/>
-                        <a:latin typeface="Calibri" panose="020F0502020204030204" pitchFamily="34" charset="0"/>
-                        <a:ea typeface="Calibri" panose="020F0502020204030204" pitchFamily="34" charset="0"/>
-                        <a:cs typeface="Times New Roman" panose="02020603050405020304" pitchFamily="18" charset="0"/>
-                      </a:endParaRPr>
                     </a:p>
                   </a:txBody>
                   <a:tcPr marL="68580" marR="68580" marT="0" marB="0" anchor="ctr"/>
@@ -7712,34 +7662,37 @@
                         </a:spcAft>
                       </a:pPr>
                       <a:r>
-                        <a:rPr lang="tr-TR" sz="2000" dirty="0">
+                        <a:rPr lang="tr-TR" sz="2000" kern="1200" dirty="0">
                           <a:solidFill>
-                            <a:schemeClr val="bg1">
-                              <a:lumMod val="75000"/>
-                            </a:schemeClr>
+                            <a:schemeClr val="tx1"/>
                           </a:solidFill>
                           <a:effectLst/>
+                          <a:latin typeface="+mn-lt"/>
+                          <a:ea typeface="+mn-ea"/>
+                          <a:cs typeface="+mn-cs"/>
                         </a:rPr>
                         <a:t>Data Analysis (Veri Analizi) </a:t>
                       </a:r>
                       <a:r>
-                        <a:rPr lang="tr-TR" sz="2000" dirty="0" err="1">
+                        <a:rPr lang="tr-TR" sz="2000" kern="1200" dirty="0" err="1">
                           <a:solidFill>
-                            <a:schemeClr val="bg1">
-                              <a:lumMod val="75000"/>
-                            </a:schemeClr>
+                            <a:schemeClr val="tx1"/>
                           </a:solidFill>
                           <a:effectLst/>
+                          <a:latin typeface="+mn-lt"/>
+                          <a:ea typeface="+mn-ea"/>
+                          <a:cs typeface="+mn-cs"/>
                         </a:rPr>
                         <a:t>Pandas</a:t>
                       </a:r>
-                      <a:endParaRPr lang="tr-TR" sz="2000" dirty="0">
+                      <a:endParaRPr lang="tr-TR" sz="2000" kern="1200" dirty="0">
                         <a:solidFill>
-                          <a:schemeClr val="bg1">
-                            <a:lumMod val="75000"/>
-                          </a:schemeClr>
+                          <a:schemeClr val="tx1"/>
                         </a:solidFill>
                         <a:effectLst/>
+                        <a:latin typeface="+mn-lt"/>
+                        <a:ea typeface="+mn-ea"/>
+                        <a:cs typeface="+mn-cs"/>
                       </a:endParaRPr>
                     </a:p>
                   </a:txBody>
@@ -7759,27 +7712,17 @@
                         </a:spcAft>
                       </a:pPr>
                       <a:r>
-                        <a:rPr lang="tr-TR" sz="2000" dirty="0">
+                        <a:rPr lang="tr-TR" sz="2000" kern="1200" dirty="0">
                           <a:solidFill>
-                            <a:schemeClr val="bg1">
-                              <a:lumMod val="75000"/>
-                            </a:schemeClr>
+                            <a:schemeClr val="tx1"/>
                           </a:solidFill>
                           <a:effectLst/>
+                          <a:latin typeface="+mn-lt"/>
+                          <a:ea typeface="+mn-ea"/>
+                          <a:cs typeface="+mn-cs"/>
                         </a:rPr>
                         <a:t>1 GÜN</a:t>
                       </a:r>
-                      <a:endParaRPr lang="tr-TR" sz="2000" dirty="0">
-                        <a:solidFill>
-                          <a:schemeClr val="bg1">
-                            <a:lumMod val="75000"/>
-                          </a:schemeClr>
-                        </a:solidFill>
-                        <a:effectLst/>
-                        <a:latin typeface="Calibri" panose="020F0502020204030204" pitchFamily="34" charset="0"/>
-                        <a:ea typeface="Calibri" panose="020F0502020204030204" pitchFamily="34" charset="0"/>
-                        <a:cs typeface="Times New Roman" panose="02020603050405020304" pitchFamily="18" charset="0"/>
-                      </a:endParaRPr>
                     </a:p>
                   </a:txBody>
                   <a:tcPr marL="68580" marR="68580" marT="0" marB="0" anchor="ctr"/>
@@ -7798,27 +7741,17 @@
                         </a:spcAft>
                       </a:pPr>
                       <a:r>
-                        <a:rPr lang="tr-TR" sz="2000">
+                        <a:rPr lang="tr-TR" sz="2000" kern="1200" dirty="0">
                           <a:solidFill>
-                            <a:schemeClr val="bg1">
-                              <a:lumMod val="75000"/>
-                            </a:schemeClr>
+                            <a:schemeClr val="tx1"/>
                           </a:solidFill>
                           <a:effectLst/>
-                        </a:rPr>
-                        <a:t>15-16 Mayıs 2019</a:t>
-                      </a:r>
-                      <a:endParaRPr lang="tr-TR" sz="2000">
-                        <a:solidFill>
-                          <a:schemeClr val="bg1">
-                            <a:lumMod val="75000"/>
-                          </a:schemeClr>
-                        </a:solidFill>
-                        <a:effectLst/>
-                        <a:latin typeface="Calibri" panose="020F0502020204030204" pitchFamily="34" charset="0"/>
-                        <a:ea typeface="Calibri" panose="020F0502020204030204" pitchFamily="34" charset="0"/>
-                        <a:cs typeface="Times New Roman" panose="02020603050405020304" pitchFamily="18" charset="0"/>
-                      </a:endParaRPr>
+                          <a:latin typeface="+mn-lt"/>
+                          <a:ea typeface="+mn-ea"/>
+                          <a:cs typeface="+mn-cs"/>
+                        </a:rPr>
+                        <a:t>16 Mayıs 2019</a:t>
+                      </a:r>
                     </a:p>
                   </a:txBody>
                   <a:tcPr marL="68580" marR="68580" marT="0" marB="0" anchor="ctr"/>
@@ -7844,27 +7777,17 @@
                         </a:spcAft>
                       </a:pPr>
                       <a:r>
-                        <a:rPr lang="tr-TR" sz="2000">
+                        <a:rPr lang="tr-TR" sz="2000" kern="1200">
                           <a:solidFill>
-                            <a:schemeClr val="bg1">
-                              <a:lumMod val="75000"/>
-                            </a:schemeClr>
+                            <a:schemeClr val="tx1"/>
                           </a:solidFill>
                           <a:effectLst/>
+                          <a:latin typeface="+mn-lt"/>
+                          <a:ea typeface="+mn-ea"/>
+                          <a:cs typeface="+mn-cs"/>
                         </a:rPr>
                         <a:t>3.</a:t>
                       </a:r>
-                      <a:endParaRPr lang="tr-TR" sz="2000">
-                        <a:solidFill>
-                          <a:schemeClr val="bg1">
-                            <a:lumMod val="75000"/>
-                          </a:schemeClr>
-                        </a:solidFill>
-                        <a:effectLst/>
-                        <a:latin typeface="Calibri" panose="020F0502020204030204" pitchFamily="34" charset="0"/>
-                        <a:ea typeface="Calibri" panose="020F0502020204030204" pitchFamily="34" charset="0"/>
-                        <a:cs typeface="Times New Roman" panose="02020603050405020304" pitchFamily="18" charset="0"/>
-                      </a:endParaRPr>
                     </a:p>
                   </a:txBody>
                   <a:tcPr marL="68580" marR="68580" marT="0" marB="0" anchor="ctr"/>
@@ -7883,100 +7806,109 @@
                         </a:spcAft>
                       </a:pPr>
                       <a:r>
-                        <a:rPr lang="tr-TR" sz="2000" dirty="0">
+                        <a:rPr lang="tr-TR" sz="2000" kern="1200" dirty="0">
                           <a:solidFill>
-                            <a:schemeClr val="bg1">
-                              <a:lumMod val="75000"/>
-                            </a:schemeClr>
+                            <a:schemeClr val="tx1"/>
                           </a:solidFill>
                           <a:effectLst/>
+                          <a:latin typeface="+mn-lt"/>
+                          <a:ea typeface="+mn-ea"/>
+                          <a:cs typeface="+mn-cs"/>
                         </a:rPr>
                         <a:t>Data Analysis </a:t>
                       </a:r>
                       <a:r>
-                        <a:rPr lang="tr-TR" sz="2000" dirty="0" err="1">
+                        <a:rPr lang="tr-TR" sz="2000" kern="1200" dirty="0" err="1">
                           <a:solidFill>
-                            <a:schemeClr val="bg1">
-                              <a:lumMod val="75000"/>
-                            </a:schemeClr>
+                            <a:schemeClr val="tx1"/>
                           </a:solidFill>
                           <a:effectLst/>
+                          <a:latin typeface="+mn-lt"/>
+                          <a:ea typeface="+mn-ea"/>
+                          <a:cs typeface="+mn-cs"/>
                         </a:rPr>
                         <a:t>and</a:t>
                       </a:r>
                       <a:r>
-                        <a:rPr lang="tr-TR" sz="2000" dirty="0">
+                        <a:rPr lang="tr-TR" sz="2000" kern="1200" dirty="0">
                           <a:solidFill>
-                            <a:schemeClr val="bg1">
-                              <a:lumMod val="75000"/>
-                            </a:schemeClr>
+                            <a:schemeClr val="tx1"/>
                           </a:solidFill>
                           <a:effectLst/>
+                          <a:latin typeface="+mn-lt"/>
+                          <a:ea typeface="+mn-ea"/>
+                          <a:cs typeface="+mn-cs"/>
                         </a:rPr>
                         <a:t> </a:t>
                       </a:r>
                       <a:r>
-                        <a:rPr lang="tr-TR" sz="2000" dirty="0" err="1">
+                        <a:rPr lang="tr-TR" sz="2000" kern="1200" dirty="0" err="1">
                           <a:solidFill>
-                            <a:schemeClr val="bg1">
-                              <a:lumMod val="75000"/>
-                            </a:schemeClr>
+                            <a:schemeClr val="tx1"/>
                           </a:solidFill>
                           <a:effectLst/>
+                          <a:latin typeface="+mn-lt"/>
+                          <a:ea typeface="+mn-ea"/>
+                          <a:cs typeface="+mn-cs"/>
                         </a:rPr>
                         <a:t>Visualization</a:t>
                       </a:r>
                       <a:r>
-                        <a:rPr lang="tr-TR" sz="2000" dirty="0">
+                        <a:rPr lang="tr-TR" sz="2000" kern="1200" dirty="0">
                           <a:solidFill>
-                            <a:schemeClr val="bg1">
-                              <a:lumMod val="75000"/>
-                            </a:schemeClr>
+                            <a:schemeClr val="tx1"/>
                           </a:solidFill>
                           <a:effectLst/>
+                          <a:latin typeface="+mn-lt"/>
+                          <a:ea typeface="+mn-ea"/>
+                          <a:cs typeface="+mn-cs"/>
                         </a:rPr>
                         <a:t> (Veri Analizi ve Görselleştirme) </a:t>
                       </a:r>
                       <a:r>
-                        <a:rPr lang="tr-TR" sz="2000" dirty="0" err="1">
+                        <a:rPr lang="tr-TR" sz="2000" kern="1200" dirty="0" err="1">
                           <a:solidFill>
-                            <a:schemeClr val="bg1">
-                              <a:lumMod val="75000"/>
-                            </a:schemeClr>
+                            <a:schemeClr val="tx1"/>
                           </a:solidFill>
                           <a:effectLst/>
+                          <a:latin typeface="+mn-lt"/>
+                          <a:ea typeface="+mn-ea"/>
+                          <a:cs typeface="+mn-cs"/>
                         </a:rPr>
                         <a:t>Pandas</a:t>
                       </a:r>
                       <a:r>
-                        <a:rPr lang="tr-TR" sz="2000" dirty="0">
+                        <a:rPr lang="tr-TR" sz="2000" kern="1200" dirty="0">
                           <a:solidFill>
-                            <a:schemeClr val="bg1">
-                              <a:lumMod val="75000"/>
-                            </a:schemeClr>
+                            <a:schemeClr val="tx1"/>
                           </a:solidFill>
                           <a:effectLst/>
+                          <a:latin typeface="+mn-lt"/>
+                          <a:ea typeface="+mn-ea"/>
+                          <a:cs typeface="+mn-cs"/>
                         </a:rPr>
                         <a:t> - </a:t>
                       </a:r>
                       <a:r>
-                        <a:rPr lang="tr-TR" sz="2000" dirty="0" err="1">
+                        <a:rPr lang="tr-TR" sz="2000" kern="1200" dirty="0" err="1">
                           <a:solidFill>
-                            <a:schemeClr val="bg1">
-                              <a:lumMod val="75000"/>
-                            </a:schemeClr>
+                            <a:schemeClr val="tx1"/>
                           </a:solidFill>
                           <a:effectLst/>
+                          <a:latin typeface="+mn-lt"/>
+                          <a:ea typeface="+mn-ea"/>
+                          <a:cs typeface="+mn-cs"/>
                         </a:rPr>
                         <a:t>Matplotlib</a:t>
                       </a:r>
-                      <a:endParaRPr lang="tr-TR" sz="2000" dirty="0">
+                      <a:endParaRPr lang="tr-TR" sz="2000" kern="1200" dirty="0">
                         <a:solidFill>
-                          <a:schemeClr val="bg1">
-                            <a:lumMod val="75000"/>
-                          </a:schemeClr>
+                          <a:schemeClr val="tx1"/>
                         </a:solidFill>
                         <a:effectLst/>
+                        <a:latin typeface="+mn-lt"/>
+                        <a:ea typeface="+mn-ea"/>
+                        <a:cs typeface="+mn-cs"/>
                       </a:endParaRPr>
                     </a:p>
                   </a:txBody>
@@ -7996,27 +7928,17 @@
                         </a:spcAft>
                       </a:pPr>
                       <a:r>
-                        <a:rPr lang="tr-TR" sz="2000">
+                        <a:rPr lang="tr-TR" sz="2000" kern="1200">
                           <a:solidFill>
-                            <a:schemeClr val="bg1">
-                              <a:lumMod val="75000"/>
-                            </a:schemeClr>
+                            <a:schemeClr val="tx1"/>
                           </a:solidFill>
                           <a:effectLst/>
+                          <a:latin typeface="+mn-lt"/>
+                          <a:ea typeface="+mn-ea"/>
+                          <a:cs typeface="+mn-cs"/>
                         </a:rPr>
                         <a:t>1 GÜN</a:t>
                       </a:r>
-                      <a:endParaRPr lang="tr-TR" sz="2000">
-                        <a:solidFill>
-                          <a:schemeClr val="bg1">
-                            <a:lumMod val="75000"/>
-                          </a:schemeClr>
-                        </a:solidFill>
-                        <a:effectLst/>
-                        <a:latin typeface="Calibri" panose="020F0502020204030204" pitchFamily="34" charset="0"/>
-                        <a:ea typeface="Calibri" panose="020F0502020204030204" pitchFamily="34" charset="0"/>
-                        <a:cs typeface="Times New Roman" panose="02020603050405020304" pitchFamily="18" charset="0"/>
-                      </a:endParaRPr>
                     </a:p>
                   </a:txBody>
                   <a:tcPr marL="68580" marR="68580" marT="0" marB="0" anchor="ctr"/>
@@ -8035,27 +7957,17 @@
                         </a:spcAft>
                       </a:pPr>
                       <a:r>
-                        <a:rPr lang="tr-TR" sz="2000">
+                        <a:rPr lang="tr-TR" sz="2000" kern="1200" dirty="0">
                           <a:solidFill>
-                            <a:schemeClr val="bg1">
-                              <a:lumMod val="75000"/>
-                            </a:schemeClr>
+                            <a:schemeClr val="tx1"/>
                           </a:solidFill>
                           <a:effectLst/>
-                        </a:rPr>
-                        <a:t>22-24 Mayıs 2019</a:t>
-                      </a:r>
-                      <a:endParaRPr lang="tr-TR" sz="2000">
-                        <a:solidFill>
-                          <a:schemeClr val="bg1">
-                            <a:lumMod val="75000"/>
-                          </a:schemeClr>
-                        </a:solidFill>
-                        <a:effectLst/>
-                        <a:latin typeface="Calibri" panose="020F0502020204030204" pitchFamily="34" charset="0"/>
-                        <a:ea typeface="Calibri" panose="020F0502020204030204" pitchFamily="34" charset="0"/>
-                        <a:cs typeface="Times New Roman" panose="02020603050405020304" pitchFamily="18" charset="0"/>
-                      </a:endParaRPr>
+                          <a:latin typeface="+mn-lt"/>
+                          <a:ea typeface="+mn-ea"/>
+                          <a:cs typeface="+mn-cs"/>
+                        </a:rPr>
+                        <a:t>22 Mayıs 2019</a:t>
+                      </a:r>
                     </a:p>
                   </a:txBody>
                   <a:tcPr marL="68580" marR="68580" marT="0" marB="0" anchor="ctr"/>
@@ -8081,27 +7993,17 @@
                         </a:spcAft>
                       </a:pPr>
                       <a:r>
-                        <a:rPr lang="tr-TR" sz="2000">
+                        <a:rPr lang="tr-TR" sz="2000" kern="1200">
                           <a:solidFill>
-                            <a:schemeClr val="bg1">
-                              <a:lumMod val="75000"/>
-                            </a:schemeClr>
+                            <a:schemeClr val="tx1"/>
                           </a:solidFill>
                           <a:effectLst/>
+                          <a:latin typeface="+mn-lt"/>
+                          <a:ea typeface="+mn-ea"/>
+                          <a:cs typeface="+mn-cs"/>
                         </a:rPr>
                         <a:t>4.</a:t>
                       </a:r>
-                      <a:endParaRPr lang="tr-TR" sz="2000">
-                        <a:solidFill>
-                          <a:schemeClr val="bg1">
-                            <a:lumMod val="75000"/>
-                          </a:schemeClr>
-                        </a:solidFill>
-                        <a:effectLst/>
-                        <a:latin typeface="Calibri" panose="020F0502020204030204" pitchFamily="34" charset="0"/>
-                        <a:ea typeface="Calibri" panose="020F0502020204030204" pitchFamily="34" charset="0"/>
-                        <a:cs typeface="Times New Roman" panose="02020603050405020304" pitchFamily="18" charset="0"/>
-                      </a:endParaRPr>
                     </a:p>
                   </a:txBody>
                   <a:tcPr marL="68580" marR="68580" marT="0" marB="0" anchor="ctr"/>
@@ -8129,49 +8031,41 @@
                         <a:defRPr/>
                       </a:pPr>
                       <a:r>
-                        <a:rPr lang="tr-TR" sz="2000" dirty="0">
+                        <a:rPr lang="tr-TR" sz="2000" kern="1200" dirty="0">
                           <a:solidFill>
-                            <a:schemeClr val="bg1">
-                              <a:lumMod val="75000"/>
-                            </a:schemeClr>
+                            <a:schemeClr val="tx1"/>
                           </a:solidFill>
                           <a:effectLst/>
+                          <a:latin typeface="+mn-lt"/>
+                          <a:ea typeface="+mn-ea"/>
+                          <a:cs typeface="+mn-cs"/>
                         </a:rPr>
                         <a:t>Data </a:t>
                       </a:r>
                       <a:r>
-                        <a:rPr lang="tr-TR" sz="2000" dirty="0" err="1">
+                        <a:rPr lang="tr-TR" sz="2000" kern="1200" dirty="0" err="1">
                           <a:solidFill>
-                            <a:schemeClr val="bg1">
-                              <a:lumMod val="75000"/>
-                            </a:schemeClr>
+                            <a:schemeClr val="tx1"/>
                           </a:solidFill>
                           <a:effectLst/>
+                          <a:latin typeface="+mn-lt"/>
+                          <a:ea typeface="+mn-ea"/>
+                          <a:cs typeface="+mn-cs"/>
                         </a:rPr>
                         <a:t>Preprocessing</a:t>
                       </a:r>
                       <a:r>
-                        <a:rPr lang="tr-TR" sz="2000" dirty="0">
+                        <a:rPr lang="tr-TR" sz="2000" kern="1200" dirty="0">
                           <a:solidFill>
-                            <a:schemeClr val="bg1">
-                              <a:lumMod val="75000"/>
-                            </a:schemeClr>
+                            <a:schemeClr val="tx1"/>
                           </a:solidFill>
                           <a:effectLst/>
+                          <a:latin typeface="+mn-lt"/>
+                          <a:ea typeface="+mn-ea"/>
+                          <a:cs typeface="+mn-cs"/>
                         </a:rPr>
                         <a:t> (Veri Ön İşleme)</a:t>
                       </a:r>
-                      <a:endParaRPr lang="tr-TR" sz="2000" dirty="0">
-                        <a:solidFill>
-                          <a:schemeClr val="bg1">
-                            <a:lumMod val="75000"/>
-                          </a:schemeClr>
-                        </a:solidFill>
-                        <a:effectLst/>
-                        <a:latin typeface="Calibri" panose="020F0502020204030204" pitchFamily="34" charset="0"/>
-                        <a:ea typeface="Calibri" panose="020F0502020204030204" pitchFamily="34" charset="0"/>
-                        <a:cs typeface="Times New Roman" panose="02020603050405020304" pitchFamily="18" charset="0"/>
-                      </a:endParaRPr>
                     </a:p>
                     <a:p>
                       <a:pPr>
@@ -8183,35 +8077,38 @@
                         </a:spcAft>
                       </a:pPr>
                       <a:r>
-                        <a:rPr lang="tr-TR" sz="2000" dirty="0">
+                        <a:rPr lang="tr-TR" sz="2000" kern="1200" dirty="0">
                           <a:solidFill>
-                            <a:schemeClr val="bg1">
-                              <a:lumMod val="75000"/>
-                            </a:schemeClr>
+                            <a:schemeClr val="tx1"/>
                           </a:solidFill>
                           <a:effectLst/>
+                          <a:latin typeface="+mn-lt"/>
+                          <a:ea typeface="+mn-ea"/>
+                          <a:cs typeface="+mn-cs"/>
                         </a:rPr>
                         <a:t>Data </a:t>
                       </a:r>
                       <a:r>
-                        <a:rPr lang="tr-TR" sz="2000" dirty="0" err="1">
+                        <a:rPr lang="tr-TR" sz="2000" kern="1200" dirty="0" err="1">
                           <a:solidFill>
-                            <a:schemeClr val="bg1">
-                              <a:lumMod val="75000"/>
-                            </a:schemeClr>
+                            <a:schemeClr val="tx1"/>
                           </a:solidFill>
                           <a:effectLst/>
+                          <a:latin typeface="+mn-lt"/>
+                          <a:ea typeface="+mn-ea"/>
+                          <a:cs typeface="+mn-cs"/>
                         </a:rPr>
                         <a:t>Cleaning</a:t>
                       </a:r>
                       <a:r>
-                        <a:rPr lang="tr-TR" sz="2000" dirty="0">
+                        <a:rPr lang="tr-TR" sz="2000" kern="1200" dirty="0">
                           <a:solidFill>
-                            <a:schemeClr val="bg1">
-                              <a:lumMod val="75000"/>
-                            </a:schemeClr>
+                            <a:schemeClr val="tx1"/>
                           </a:solidFill>
                           <a:effectLst/>
+                          <a:latin typeface="+mn-lt"/>
+                          <a:ea typeface="+mn-ea"/>
+                          <a:cs typeface="+mn-cs"/>
                         </a:rPr>
                         <a:t> (Veri Temizleme)</a:t>
                       </a:r>
@@ -8235,115 +8132,113 @@
                         <a:defRPr/>
                       </a:pPr>
                       <a:r>
-                        <a:rPr lang="tr-TR" sz="2000" dirty="0">
+                        <a:rPr lang="tr-TR" sz="2000" kern="1200" dirty="0">
                           <a:solidFill>
-                            <a:schemeClr val="bg1">
-                              <a:lumMod val="75000"/>
-                            </a:schemeClr>
+                            <a:schemeClr val="tx1"/>
                           </a:solidFill>
                           <a:effectLst/>
+                          <a:latin typeface="+mn-lt"/>
+                          <a:ea typeface="+mn-ea"/>
+                          <a:cs typeface="+mn-cs"/>
                         </a:rPr>
                         <a:t>ETL (</a:t>
                       </a:r>
                       <a:r>
-                        <a:rPr lang="tr-TR" sz="2000" dirty="0" err="1">
+                        <a:rPr lang="tr-TR" sz="2000" kern="1200" dirty="0" err="1">
                           <a:solidFill>
-                            <a:schemeClr val="bg1">
-                              <a:lumMod val="75000"/>
-                            </a:schemeClr>
+                            <a:schemeClr val="tx1"/>
                           </a:solidFill>
                           <a:effectLst/>
+                          <a:latin typeface="+mn-lt"/>
+                          <a:ea typeface="+mn-ea"/>
+                          <a:cs typeface="+mn-cs"/>
                         </a:rPr>
                         <a:t>Extract</a:t>
                       </a:r>
                       <a:r>
-                        <a:rPr lang="tr-TR" sz="2000" dirty="0">
+                        <a:rPr lang="tr-TR" sz="2000" kern="1200" dirty="0">
                           <a:solidFill>
-                            <a:schemeClr val="bg1">
-                              <a:lumMod val="75000"/>
-                            </a:schemeClr>
+                            <a:schemeClr val="tx1"/>
                           </a:solidFill>
                           <a:effectLst/>
+                          <a:latin typeface="+mn-lt"/>
+                          <a:ea typeface="+mn-ea"/>
+                          <a:cs typeface="+mn-cs"/>
                         </a:rPr>
                         <a:t>, </a:t>
                       </a:r>
                       <a:r>
-                        <a:rPr lang="tr-TR" sz="2000" dirty="0" err="1">
+                        <a:rPr lang="tr-TR" sz="2000" kern="1200" dirty="0" err="1">
                           <a:solidFill>
-                            <a:schemeClr val="bg1">
-                              <a:lumMod val="75000"/>
-                            </a:schemeClr>
+                            <a:schemeClr val="tx1"/>
                           </a:solidFill>
                           <a:effectLst/>
+                          <a:latin typeface="+mn-lt"/>
+                          <a:ea typeface="+mn-ea"/>
+                          <a:cs typeface="+mn-cs"/>
                         </a:rPr>
                         <a:t>Transform</a:t>
                       </a:r>
                       <a:r>
-                        <a:rPr lang="tr-TR" sz="2000" dirty="0">
+                        <a:rPr lang="tr-TR" sz="2000" kern="1200" dirty="0">
                           <a:solidFill>
-                            <a:schemeClr val="bg1">
-                              <a:lumMod val="75000"/>
-                            </a:schemeClr>
+                            <a:schemeClr val="tx1"/>
                           </a:solidFill>
                           <a:effectLst/>
+                          <a:latin typeface="+mn-lt"/>
+                          <a:ea typeface="+mn-ea"/>
+                          <a:cs typeface="+mn-cs"/>
                         </a:rPr>
                         <a:t> </a:t>
                       </a:r>
                       <a:r>
-                        <a:rPr lang="tr-TR" sz="2000" dirty="0" err="1">
+                        <a:rPr lang="tr-TR" sz="2000" kern="1200" dirty="0" err="1">
                           <a:solidFill>
-                            <a:schemeClr val="bg1">
-                              <a:lumMod val="75000"/>
-                            </a:schemeClr>
+                            <a:schemeClr val="tx1"/>
                           </a:solidFill>
                           <a:effectLst/>
+                          <a:latin typeface="+mn-lt"/>
+                          <a:ea typeface="+mn-ea"/>
+                          <a:cs typeface="+mn-cs"/>
                         </a:rPr>
                         <a:t>and</a:t>
                       </a:r>
                       <a:r>
-                        <a:rPr lang="tr-TR" sz="2000" dirty="0">
+                        <a:rPr lang="tr-TR" sz="2000" kern="1200" dirty="0">
                           <a:solidFill>
-                            <a:schemeClr val="bg1">
-                              <a:lumMod val="75000"/>
-                            </a:schemeClr>
+                            <a:schemeClr val="tx1"/>
                           </a:solidFill>
                           <a:effectLst/>
+                          <a:latin typeface="+mn-lt"/>
+                          <a:ea typeface="+mn-ea"/>
+                          <a:cs typeface="+mn-cs"/>
                         </a:rPr>
                         <a:t> </a:t>
                       </a:r>
                       <a:r>
-                        <a:rPr lang="tr-TR" sz="2000" dirty="0" err="1">
+                        <a:rPr lang="tr-TR" sz="2000" kern="1200" dirty="0" err="1">
                           <a:solidFill>
-                            <a:schemeClr val="bg1">
-                              <a:lumMod val="75000"/>
-                            </a:schemeClr>
+                            <a:schemeClr val="tx1"/>
                           </a:solidFill>
                           <a:effectLst/>
+                          <a:latin typeface="+mn-lt"/>
+                          <a:ea typeface="+mn-ea"/>
+                          <a:cs typeface="+mn-cs"/>
                         </a:rPr>
                         <a:t>Load</a:t>
                       </a:r>
                       <a:r>
-                        <a:rPr lang="tr-TR" sz="2000" dirty="0">
+                        <a:rPr lang="tr-TR" sz="2000" kern="1200" dirty="0">
                           <a:solidFill>
-                            <a:schemeClr val="bg1">
-                              <a:lumMod val="75000"/>
-                            </a:schemeClr>
+                            <a:schemeClr val="tx1"/>
                           </a:solidFill>
                           <a:effectLst/>
+                          <a:latin typeface="+mn-lt"/>
+                          <a:ea typeface="+mn-ea"/>
+                          <a:cs typeface="+mn-cs"/>
                         </a:rPr>
                         <a:t>)</a:t>
                       </a:r>
-                      <a:endParaRPr lang="tr-TR" sz="2000" dirty="0">
-                        <a:solidFill>
-                          <a:schemeClr val="bg1">
-                            <a:lumMod val="75000"/>
-                          </a:schemeClr>
-                        </a:solidFill>
-                        <a:effectLst/>
-                        <a:latin typeface="Calibri" panose="020F0502020204030204" pitchFamily="34" charset="0"/>
-                        <a:ea typeface="Calibri" panose="020F0502020204030204" pitchFamily="34" charset="0"/>
-                        <a:cs typeface="Times New Roman" panose="02020603050405020304" pitchFamily="18" charset="0"/>
-                      </a:endParaRPr>
                     </a:p>
                   </a:txBody>
                   <a:tcPr marL="68580" marR="68580" marT="0" marB="0" anchor="ctr"/>
@@ -8362,27 +8257,17 @@
                         </a:spcAft>
                       </a:pPr>
                       <a:r>
-                        <a:rPr lang="tr-TR" sz="2000" dirty="0">
+                        <a:rPr lang="tr-TR" sz="2000" kern="1200" dirty="0">
                           <a:solidFill>
-                            <a:schemeClr val="bg1">
-                              <a:lumMod val="75000"/>
-                            </a:schemeClr>
+                            <a:schemeClr val="tx1"/>
                           </a:solidFill>
                           <a:effectLst/>
+                          <a:latin typeface="+mn-lt"/>
+                          <a:ea typeface="+mn-ea"/>
+                          <a:cs typeface="+mn-cs"/>
                         </a:rPr>
                         <a:t>2 GÜN</a:t>
                       </a:r>
-                      <a:endParaRPr lang="tr-TR" sz="2000" dirty="0">
-                        <a:solidFill>
-                          <a:schemeClr val="bg1">
-                            <a:lumMod val="75000"/>
-                          </a:schemeClr>
-                        </a:solidFill>
-                        <a:effectLst/>
-                        <a:latin typeface="Calibri" panose="020F0502020204030204" pitchFamily="34" charset="0"/>
-                        <a:ea typeface="Calibri" panose="020F0502020204030204" pitchFamily="34" charset="0"/>
-                        <a:cs typeface="Times New Roman" panose="02020603050405020304" pitchFamily="18" charset="0"/>
-                      </a:endParaRPr>
                     </a:p>
                   </a:txBody>
                   <a:tcPr marL="68580" marR="68580" marT="0" marB="0" anchor="ctr"/>
@@ -8401,27 +8286,17 @@
                         </a:spcAft>
                       </a:pPr>
                       <a:r>
-                        <a:rPr lang="tr-TR" sz="2000" dirty="0">
+                        <a:rPr lang="tr-TR" sz="2000" kern="1200" dirty="0">
                           <a:solidFill>
-                            <a:schemeClr val="bg1">
-                              <a:lumMod val="75000"/>
-                            </a:schemeClr>
+                            <a:schemeClr val="tx1"/>
                           </a:solidFill>
                           <a:effectLst/>
-                        </a:rPr>
-                        <a:t>22-24 Mayıs 2019</a:t>
-                      </a:r>
-                      <a:endParaRPr lang="tr-TR" sz="2000" dirty="0">
-                        <a:solidFill>
-                          <a:schemeClr val="bg1">
-                            <a:lumMod val="75000"/>
-                          </a:schemeClr>
-                        </a:solidFill>
-                        <a:effectLst/>
-                        <a:latin typeface="Calibri" panose="020F0502020204030204" pitchFamily="34" charset="0"/>
-                        <a:ea typeface="Calibri" panose="020F0502020204030204" pitchFamily="34" charset="0"/>
-                        <a:cs typeface="Times New Roman" panose="02020603050405020304" pitchFamily="18" charset="0"/>
-                      </a:endParaRPr>
+                          <a:latin typeface="+mn-lt"/>
+                          <a:ea typeface="+mn-ea"/>
+                          <a:cs typeface="+mn-cs"/>
+                        </a:rPr>
+                        <a:t>23, 24 Mayıs 2019</a:t>
+                      </a:r>
                     </a:p>
                   </a:txBody>
                   <a:tcPr marL="68580" marR="68580" marT="0" marB="0" anchor="ctr"/>
@@ -8449,9 +8324,7 @@
                       <a:r>
                         <a:rPr lang="tr-TR" sz="2000" kern="1200" dirty="0">
                           <a:solidFill>
-                            <a:schemeClr val="bg1">
-                              <a:lumMod val="75000"/>
-                            </a:schemeClr>
+                            <a:schemeClr val="tx1"/>
                           </a:solidFill>
                           <a:effectLst/>
                           <a:latin typeface="+mn-lt"/>
@@ -8480,9 +8353,7 @@
                       <a:r>
                         <a:rPr lang="tr-TR" sz="2000" kern="1200" dirty="0">
                           <a:solidFill>
-                            <a:schemeClr val="bg1">
-                              <a:lumMod val="75000"/>
-                            </a:schemeClr>
+                            <a:schemeClr val="tx1"/>
                           </a:solidFill>
                           <a:effectLst/>
                           <a:latin typeface="+mn-lt"/>
@@ -8511,9 +8382,7 @@
                       <a:r>
                         <a:rPr lang="tr-TR" sz="2000" kern="1200" dirty="0">
                           <a:solidFill>
-                            <a:schemeClr val="bg1">
-                              <a:lumMod val="75000"/>
-                            </a:schemeClr>
+                            <a:schemeClr val="tx1"/>
                           </a:solidFill>
                           <a:effectLst/>
                           <a:latin typeface="+mn-lt"/>
@@ -8542,9 +8411,7 @@
                       <a:r>
                         <a:rPr lang="tr-TR" sz="2000" kern="1200" dirty="0">
                           <a:solidFill>
-                            <a:schemeClr val="bg1">
-                              <a:lumMod val="75000"/>
-                            </a:schemeClr>
+                            <a:schemeClr val="tx1"/>
                           </a:solidFill>
                           <a:effectLst/>
                           <a:latin typeface="+mn-lt"/>
@@ -8580,9 +8447,7 @@
                       <a:r>
                         <a:rPr lang="tr-TR" sz="2000" kern="1200" dirty="0">
                           <a:solidFill>
-                            <a:schemeClr val="bg1">
-                              <a:lumMod val="75000"/>
-                            </a:schemeClr>
+                            <a:schemeClr val="tx1"/>
                           </a:solidFill>
                           <a:effectLst/>
                           <a:latin typeface="+mn-lt"/>
@@ -8611,9 +8476,7 @@
                       <a:r>
                         <a:rPr lang="tr-TR" sz="2000" kern="1200" dirty="0" err="1">
                           <a:solidFill>
-                            <a:schemeClr val="bg1">
-                              <a:lumMod val="75000"/>
-                            </a:schemeClr>
+                            <a:schemeClr val="tx1"/>
                           </a:solidFill>
                           <a:effectLst/>
                           <a:latin typeface="+mn-lt"/>
@@ -8625,9 +8488,7 @@
                       <a:r>
                         <a:rPr lang="tr-TR" sz="2000" kern="1200" dirty="0">
                           <a:solidFill>
-                            <a:schemeClr val="bg1">
-                              <a:lumMod val="75000"/>
-                            </a:schemeClr>
+                            <a:schemeClr val="tx1"/>
                           </a:solidFill>
                           <a:effectLst/>
                           <a:latin typeface="+mn-lt"/>
@@ -8656,9 +8517,7 @@
                       <a:r>
                         <a:rPr lang="tr-TR" sz="2000" kern="1200" dirty="0">
                           <a:solidFill>
-                            <a:schemeClr val="bg1">
-                              <a:lumMod val="75000"/>
-                            </a:schemeClr>
+                            <a:schemeClr val="tx1"/>
                           </a:solidFill>
                           <a:effectLst/>
                           <a:latin typeface="+mn-lt"/>
@@ -8687,9 +8546,7 @@
                       <a:r>
                         <a:rPr lang="tr-TR" sz="2000" kern="1200" dirty="0">
                           <a:solidFill>
-                            <a:schemeClr val="bg1">
-                              <a:lumMod val="75000"/>
-                            </a:schemeClr>
+                            <a:schemeClr val="tx1"/>
                           </a:solidFill>
                           <a:effectLst/>
                           <a:latin typeface="+mn-lt"/>
@@ -8723,17 +8580,17 @@
                         </a:spcAft>
                       </a:pPr>
                       <a:r>
-                        <a:rPr lang="tr-TR" sz="2000">
-                          <a:effectLst/>
+                        <a:rPr lang="tr-TR" sz="2000" kern="1200">
+                          <a:solidFill>
+                            <a:schemeClr val="tx1"/>
+                          </a:solidFill>
+                          <a:effectLst/>
+                          <a:latin typeface="+mn-lt"/>
+                          <a:ea typeface="+mn-ea"/>
+                          <a:cs typeface="+mn-cs"/>
                         </a:rPr>
                         <a:t>7.</a:t>
                       </a:r>
-                      <a:endParaRPr lang="tr-TR" sz="2000">
-                        <a:effectLst/>
-                        <a:latin typeface="Calibri" panose="020F0502020204030204" pitchFamily="34" charset="0"/>
-                        <a:ea typeface="Calibri" panose="020F0502020204030204" pitchFamily="34" charset="0"/>
-                        <a:cs typeface="Times New Roman" panose="02020603050405020304" pitchFamily="18" charset="0"/>
-                      </a:endParaRPr>
                     </a:p>
                   </a:txBody>
                   <a:tcPr marL="68580" marR="68580" marT="0" marB="0" anchor="ctr"/>
@@ -8752,23 +8609,29 @@
                         </a:spcAft>
                       </a:pPr>
                       <a:r>
-                        <a:rPr lang="tr-TR" sz="2000" dirty="0" err="1">
-                          <a:effectLst/>
+                        <a:rPr lang="tr-TR" sz="2000" kern="1200" dirty="0" err="1">
+                          <a:solidFill>
+                            <a:schemeClr val="tx1"/>
+                          </a:solidFill>
+                          <a:effectLst/>
+                          <a:latin typeface="+mn-lt"/>
+                          <a:ea typeface="+mn-ea"/>
+                          <a:cs typeface="+mn-cs"/>
                         </a:rPr>
                         <a:t>Big</a:t>
                       </a:r>
                       <a:r>
-                        <a:rPr lang="tr-TR" sz="2000" dirty="0">
-                          <a:effectLst/>
+                        <a:rPr lang="tr-TR" sz="2000" kern="1200" dirty="0">
+                          <a:solidFill>
+                            <a:schemeClr val="tx1"/>
+                          </a:solidFill>
+                          <a:effectLst/>
+                          <a:latin typeface="+mn-lt"/>
+                          <a:ea typeface="+mn-ea"/>
+                          <a:cs typeface="+mn-cs"/>
                         </a:rPr>
                         <a:t> Data (Büyük Veri)</a:t>
                       </a:r>
-                      <a:endParaRPr lang="tr-TR" sz="2000" dirty="0">
-                        <a:effectLst/>
-                        <a:latin typeface="Calibri" panose="020F0502020204030204" pitchFamily="34" charset="0"/>
-                        <a:ea typeface="Calibri" panose="020F0502020204030204" pitchFamily="34" charset="0"/>
-                        <a:cs typeface="Times New Roman" panose="02020603050405020304" pitchFamily="18" charset="0"/>
-                      </a:endParaRPr>
                     </a:p>
                   </a:txBody>
                   <a:tcPr marL="68580" marR="68580" marT="0" marB="0" anchor="ctr"/>
@@ -8787,17 +8650,17 @@
                         </a:spcAft>
                       </a:pPr>
                       <a:r>
-                        <a:rPr lang="tr-TR" sz="2000">
-                          <a:effectLst/>
+                        <a:rPr lang="tr-TR" sz="2000" kern="1200">
+                          <a:solidFill>
+                            <a:schemeClr val="tx1"/>
+                          </a:solidFill>
+                          <a:effectLst/>
+                          <a:latin typeface="+mn-lt"/>
+                          <a:ea typeface="+mn-ea"/>
+                          <a:cs typeface="+mn-cs"/>
                         </a:rPr>
                         <a:t>3 GÜN</a:t>
                       </a:r>
-                      <a:endParaRPr lang="tr-TR" sz="2000">
-                        <a:effectLst/>
-                        <a:latin typeface="Calibri" panose="020F0502020204030204" pitchFamily="34" charset="0"/>
-                        <a:ea typeface="Calibri" panose="020F0502020204030204" pitchFamily="34" charset="0"/>
-                        <a:cs typeface="Times New Roman" panose="02020603050405020304" pitchFamily="18" charset="0"/>
-                      </a:endParaRPr>
                     </a:p>
                   </a:txBody>
                   <a:tcPr marL="68580" marR="68580" marT="0" marB="0" anchor="ctr"/>
@@ -8816,17 +8679,17 @@
                         </a:spcAft>
                       </a:pPr>
                       <a:r>
-                        <a:rPr lang="tr-TR" sz="2000" dirty="0">
-                          <a:effectLst/>
+                        <a:rPr lang="tr-TR" sz="2000" kern="1200" dirty="0">
+                          <a:solidFill>
+                            <a:schemeClr val="tx1"/>
+                          </a:solidFill>
+                          <a:effectLst/>
+                          <a:latin typeface="+mn-lt"/>
+                          <a:ea typeface="+mn-ea"/>
+                          <a:cs typeface="+mn-cs"/>
                         </a:rPr>
                         <a:t>23, 24, 25 Temmuz 2019</a:t>
                       </a:r>
-                      <a:endParaRPr lang="tr-TR" sz="2000" dirty="0">
-                        <a:effectLst/>
-                        <a:latin typeface="Calibri" panose="020F0502020204030204" pitchFamily="34" charset="0"/>
-                        <a:ea typeface="Calibri" panose="020F0502020204030204" pitchFamily="34" charset="0"/>
-                        <a:cs typeface="Times New Roman" panose="02020603050405020304" pitchFamily="18" charset="0"/>
-                      </a:endParaRPr>
                     </a:p>
                   </a:txBody>
                   <a:tcPr marL="68580" marR="68580" marT="0" marB="0" anchor="ctr"/>
@@ -8852,17 +8715,17 @@
                         </a:spcAft>
                       </a:pPr>
                       <a:r>
-                        <a:rPr lang="tr-TR" sz="2000">
-                          <a:effectLst/>
+                        <a:rPr lang="tr-TR" sz="2000" kern="1200">
+                          <a:solidFill>
+                            <a:schemeClr val="tx1"/>
+                          </a:solidFill>
+                          <a:effectLst/>
+                          <a:latin typeface="+mn-lt"/>
+                          <a:ea typeface="+mn-ea"/>
+                          <a:cs typeface="+mn-cs"/>
                         </a:rPr>
                         <a:t> </a:t>
                       </a:r>
-                      <a:endParaRPr lang="tr-TR" sz="2000">
-                        <a:effectLst/>
-                        <a:latin typeface="Calibri" panose="020F0502020204030204" pitchFamily="34" charset="0"/>
-                        <a:ea typeface="Calibri" panose="020F0502020204030204" pitchFamily="34" charset="0"/>
-                        <a:cs typeface="Times New Roman" panose="02020603050405020304" pitchFamily="18" charset="0"/>
-                      </a:endParaRPr>
                     </a:p>
                   </a:txBody>
                   <a:tcPr marL="68580" marR="68580" marT="0" marB="0" anchor="ctr"/>
@@ -8881,17 +8744,17 @@
                         </a:spcAft>
                       </a:pPr>
                       <a:r>
-                        <a:rPr lang="tr-TR" sz="2000">
-                          <a:effectLst/>
+                        <a:rPr lang="tr-TR" sz="2000" kern="1200">
+                          <a:solidFill>
+                            <a:schemeClr val="tx1"/>
+                          </a:solidFill>
+                          <a:effectLst/>
+                          <a:latin typeface="+mn-lt"/>
+                          <a:ea typeface="+mn-ea"/>
+                          <a:cs typeface="+mn-cs"/>
                         </a:rPr>
                         <a:t>TOPLAM</a:t>
                       </a:r>
-                      <a:endParaRPr lang="tr-TR" sz="2000">
-                        <a:effectLst/>
-                        <a:latin typeface="Calibri" panose="020F0502020204030204" pitchFamily="34" charset="0"/>
-                        <a:ea typeface="Calibri" panose="020F0502020204030204" pitchFamily="34" charset="0"/>
-                        <a:cs typeface="Times New Roman" panose="02020603050405020304" pitchFamily="18" charset="0"/>
-                      </a:endParaRPr>
                     </a:p>
                   </a:txBody>
                   <a:tcPr marL="68580" marR="68580" marT="0" marB="0" anchor="ctr"/>
@@ -8910,17 +8773,17 @@
                         </a:spcAft>
                       </a:pPr>
                       <a:r>
-                        <a:rPr lang="tr-TR" sz="2000">
-                          <a:effectLst/>
+                        <a:rPr lang="tr-TR" sz="2000" kern="1200">
+                          <a:solidFill>
+                            <a:schemeClr val="tx1"/>
+                          </a:solidFill>
+                          <a:effectLst/>
+                          <a:latin typeface="+mn-lt"/>
+                          <a:ea typeface="+mn-ea"/>
+                          <a:cs typeface="+mn-cs"/>
                         </a:rPr>
                         <a:t>12 GÜN</a:t>
                       </a:r>
-                      <a:endParaRPr lang="tr-TR" sz="2000">
-                        <a:effectLst/>
-                        <a:latin typeface="Calibri" panose="020F0502020204030204" pitchFamily="34" charset="0"/>
-                        <a:ea typeface="Calibri" panose="020F0502020204030204" pitchFamily="34" charset="0"/>
-                        <a:cs typeface="Times New Roman" panose="02020603050405020304" pitchFamily="18" charset="0"/>
-                      </a:endParaRPr>
                     </a:p>
                   </a:txBody>
                   <a:tcPr marL="68580" marR="68580" marT="0" marB="0" anchor="ctr"/>
@@ -8939,17 +8802,17 @@
                         </a:spcAft>
                       </a:pPr>
                       <a:r>
-                        <a:rPr lang="tr-TR" sz="2000" dirty="0">
-                          <a:effectLst/>
+                        <a:rPr lang="tr-TR" sz="2000" kern="1200" dirty="0">
+                          <a:solidFill>
+                            <a:schemeClr val="tx1"/>
+                          </a:solidFill>
+                          <a:effectLst/>
+                          <a:latin typeface="+mn-lt"/>
+                          <a:ea typeface="+mn-ea"/>
+                          <a:cs typeface="+mn-cs"/>
                         </a:rPr>
                         <a:t> </a:t>
                       </a:r>
-                      <a:endParaRPr lang="tr-TR" sz="2000" dirty="0">
-                        <a:effectLst/>
-                        <a:latin typeface="Calibri" panose="020F0502020204030204" pitchFamily="34" charset="0"/>
-                        <a:ea typeface="Calibri" panose="020F0502020204030204" pitchFamily="34" charset="0"/>
-                        <a:cs typeface="Times New Roman" panose="02020603050405020304" pitchFamily="18" charset="0"/>
-                      </a:endParaRPr>
                     </a:p>
                   </a:txBody>
                   <a:tcPr marL="68580" marR="68580" marT="0" marB="0" anchor="ctr"/>

</xml_diff>